<commit_message>
Update cheatsheet and description
</commit_message>
<xml_diff>
--- a/man/figures/cheatsheet/cheatsheet-algorithm.pptx
+++ b/man/figures/cheatsheet/cheatsheet-algorithm.pptx
@@ -441,6 +441,52 @@
     </pc:docChg>
   </pc:docChgLst>
   <pc:docChgLst>
+    <pc:chgData name="Derks, Koen" userId="42903d96-be75-4cec-9136-f3710e86cd30" providerId="ADAL" clId="{76736121-1439-4CC5-B71A-43EA3D14E7B7}"/>
+    <pc:docChg chg="delSld modSld">
+      <pc:chgData name="Derks, Koen" userId="42903d96-be75-4cec-9136-f3710e86cd30" providerId="ADAL" clId="{76736121-1439-4CC5-B71A-43EA3D14E7B7}" dt="2020-11-28T22:53:19.244" v="23" actId="20577"/>
+      <pc:docMkLst>
+        <pc:docMk/>
+      </pc:docMkLst>
+      <pc:sldChg chg="del">
+        <pc:chgData name="Derks, Koen" userId="42903d96-be75-4cec-9136-f3710e86cd30" providerId="ADAL" clId="{76736121-1439-4CC5-B71A-43EA3D14E7B7}" dt="2020-11-28T22:52:40.993" v="0" actId="47"/>
+        <pc:sldMkLst>
+          <pc:docMk/>
+          <pc:sldMk cId="0" sldId="256"/>
+        </pc:sldMkLst>
+      </pc:sldChg>
+      <pc:sldChg chg="modSp mod">
+        <pc:chgData name="Derks, Koen" userId="42903d96-be75-4cec-9136-f3710e86cd30" providerId="ADAL" clId="{76736121-1439-4CC5-B71A-43EA3D14E7B7}" dt="2020-11-28T22:53:19.244" v="23" actId="20577"/>
+        <pc:sldMkLst>
+          <pc:docMk/>
+          <pc:sldMk cId="0" sldId="257"/>
+        </pc:sldMkLst>
+        <pc:spChg chg="mod">
+          <ac:chgData name="Derks, Koen" userId="42903d96-be75-4cec-9136-f3710e86cd30" providerId="ADAL" clId="{76736121-1439-4CC5-B71A-43EA3D14E7B7}" dt="2020-11-28T22:53:19.244" v="23" actId="20577"/>
+          <ac:spMkLst>
+            <pc:docMk/>
+            <pc:sldMk cId="0" sldId="257"/>
+            <ac:spMk id="334" creationId="{00000000-0000-0000-0000-000000000000}"/>
+          </ac:spMkLst>
+        </pc:spChg>
+      </pc:sldChg>
+      <pc:sldMasterChg chg="delSldLayout">
+        <pc:chgData name="Derks, Koen" userId="42903d96-be75-4cec-9136-f3710e86cd30" providerId="ADAL" clId="{76736121-1439-4CC5-B71A-43EA3D14E7B7}" dt="2020-11-28T22:52:40.993" v="0" actId="47"/>
+        <pc:sldMasterMkLst>
+          <pc:docMk/>
+          <pc:sldMasterMk cId="0" sldId="2147483648"/>
+        </pc:sldMasterMkLst>
+        <pc:sldLayoutChg chg="del">
+          <pc:chgData name="Derks, Koen" userId="42903d96-be75-4cec-9136-f3710e86cd30" providerId="ADAL" clId="{76736121-1439-4CC5-B71A-43EA3D14E7B7}" dt="2020-11-28T22:52:40.993" v="0" actId="47"/>
+          <pc:sldLayoutMkLst>
+            <pc:docMk/>
+            <pc:sldMasterMk cId="0" sldId="2147483648"/>
+            <pc:sldLayoutMk cId="0" sldId="2147483661"/>
+          </pc:sldLayoutMkLst>
+        </pc:sldLayoutChg>
+      </pc:sldMasterChg>
+    </pc:docChg>
+  </pc:docChgLst>
+  <pc:docChgLst>
     <pc:chgData name="Derks, Koen" userId="42903d96-be75-4cec-9136-f3710e86cd30" providerId="ADAL" clId="{B2C99C48-803B-45C3-BEC8-064BF2898A74}"/>
     <pc:docChg chg="custSel modSld">
       <pc:chgData name="Derks, Koen" userId="42903d96-be75-4cec-9136-f3710e86cd30" providerId="ADAL" clId="{B2C99C48-803B-45C3-BEC8-064BF2898A74}" dt="2021-09-18T11:38:05.739" v="101"/>
@@ -486,52 +532,6 @@
           </ac:spMkLst>
         </pc:spChg>
       </pc:sldChg>
-    </pc:docChg>
-  </pc:docChgLst>
-  <pc:docChgLst>
-    <pc:chgData name="Derks, Koen" userId="42903d96-be75-4cec-9136-f3710e86cd30" providerId="ADAL" clId="{76736121-1439-4CC5-B71A-43EA3D14E7B7}"/>
-    <pc:docChg chg="delSld modSld">
-      <pc:chgData name="Derks, Koen" userId="42903d96-be75-4cec-9136-f3710e86cd30" providerId="ADAL" clId="{76736121-1439-4CC5-B71A-43EA3D14E7B7}" dt="2020-11-28T22:53:19.244" v="23" actId="20577"/>
-      <pc:docMkLst>
-        <pc:docMk/>
-      </pc:docMkLst>
-      <pc:sldChg chg="del">
-        <pc:chgData name="Derks, Koen" userId="42903d96-be75-4cec-9136-f3710e86cd30" providerId="ADAL" clId="{76736121-1439-4CC5-B71A-43EA3D14E7B7}" dt="2020-11-28T22:52:40.993" v="0" actId="47"/>
-        <pc:sldMkLst>
-          <pc:docMk/>
-          <pc:sldMk cId="0" sldId="256"/>
-        </pc:sldMkLst>
-      </pc:sldChg>
-      <pc:sldChg chg="modSp mod">
-        <pc:chgData name="Derks, Koen" userId="42903d96-be75-4cec-9136-f3710e86cd30" providerId="ADAL" clId="{76736121-1439-4CC5-B71A-43EA3D14E7B7}" dt="2020-11-28T22:53:19.244" v="23" actId="20577"/>
-        <pc:sldMkLst>
-          <pc:docMk/>
-          <pc:sldMk cId="0" sldId="257"/>
-        </pc:sldMkLst>
-        <pc:spChg chg="mod">
-          <ac:chgData name="Derks, Koen" userId="42903d96-be75-4cec-9136-f3710e86cd30" providerId="ADAL" clId="{76736121-1439-4CC5-B71A-43EA3D14E7B7}" dt="2020-11-28T22:53:19.244" v="23" actId="20577"/>
-          <ac:spMkLst>
-            <pc:docMk/>
-            <pc:sldMk cId="0" sldId="257"/>
-            <ac:spMk id="334" creationId="{00000000-0000-0000-0000-000000000000}"/>
-          </ac:spMkLst>
-        </pc:spChg>
-      </pc:sldChg>
-      <pc:sldMasterChg chg="delSldLayout">
-        <pc:chgData name="Derks, Koen" userId="42903d96-be75-4cec-9136-f3710e86cd30" providerId="ADAL" clId="{76736121-1439-4CC5-B71A-43EA3D14E7B7}" dt="2020-11-28T22:52:40.993" v="0" actId="47"/>
-        <pc:sldMasterMkLst>
-          <pc:docMk/>
-          <pc:sldMasterMk cId="0" sldId="2147483648"/>
-        </pc:sldMasterMkLst>
-        <pc:sldLayoutChg chg="del">
-          <pc:chgData name="Derks, Koen" userId="42903d96-be75-4cec-9136-f3710e86cd30" providerId="ADAL" clId="{76736121-1439-4CC5-B71A-43EA3D14E7B7}" dt="2020-11-28T22:52:40.993" v="0" actId="47"/>
-          <pc:sldLayoutMkLst>
-            <pc:docMk/>
-            <pc:sldMasterMk cId="0" sldId="2147483648"/>
-            <pc:sldLayoutMk cId="0" sldId="2147483661"/>
-          </pc:sldLayoutMkLst>
-        </pc:sldLayoutChg>
-      </pc:sldMasterChg>
     </pc:docChg>
   </pc:docChgLst>
   <pc:docChgLst>
@@ -2711,7 +2711,7 @@
           </a:ln>
           <a:extLst>
             <a:ext uri="{C572A759-6A51-4108-AA02-DFA0A04FC94B}">
-              <ma14:wrappingTextBoxFlag xmlns:ma14="http://schemas.microsoft.com/office/mac/drawingml/2011/main" xmlns:a14="http://schemas.microsoft.com/office/drawing/2010/main" xmlns:m="http://schemas.openxmlformats.org/officeDocument/2006/math" xmlns="" val="1"/>
+              <ma14:wrappingTextBoxFlag xmlns="" xmlns:m="http://schemas.openxmlformats.org/officeDocument/2006/math" xmlns:a14="http://schemas.microsoft.com/office/drawing/2010/main" xmlns:ma14="http://schemas.microsoft.com/office/mac/drawingml/2011/main" val="1"/>
             </a:ext>
           </a:extLst>
         </p:spPr>
@@ -2750,7 +2750,7 @@
           </a:ln>
           <a:extLst>
             <a:ext uri="{C572A759-6A51-4108-AA02-DFA0A04FC94B}">
-              <ma14:wrappingTextBoxFlag xmlns:ma14="http://schemas.microsoft.com/office/mac/drawingml/2011/main" xmlns:a14="http://schemas.microsoft.com/office/drawing/2010/main" xmlns:m="http://schemas.openxmlformats.org/officeDocument/2006/math" xmlns="" val="1"/>
+              <ma14:wrappingTextBoxFlag xmlns="" xmlns:m="http://schemas.openxmlformats.org/officeDocument/2006/math" xmlns:a14="http://schemas.microsoft.com/office/drawing/2010/main" xmlns:ma14="http://schemas.microsoft.com/office/mac/drawingml/2011/main" val="1"/>
             </a:ext>
           </a:extLst>
         </p:spPr>
@@ -3683,7 +3683,7 @@
         </p:nvSpPr>
         <p:spPr>
           <a:xfrm>
-            <a:off x="7017888" y="5100005"/>
+            <a:off x="7017888" y="7597027"/>
             <a:ext cx="3240000" cy="2572418"/>
           </a:xfrm>
           <a:prstGeom prst="rect">
@@ -3705,7 +3705,7 @@
           <a:effectLst/>
           <a:extLst>
             <a:ext uri="{C572A759-6A51-4108-AA02-DFA0A04FC94B}">
-              <ma14:wrappingTextBoxFlag xmlns:ma14="http://schemas.microsoft.com/office/mac/drawingml/2011/main" xmlns:a14="http://schemas.microsoft.com/office/drawing/2010/main" xmlns:m="http://schemas.openxmlformats.org/officeDocument/2006/math" xmlns="" val="1"/>
+              <ma14:wrappingTextBoxFlag xmlns="" xmlns:m="http://schemas.openxmlformats.org/officeDocument/2006/math" xmlns:a14="http://schemas.microsoft.com/office/drawing/2010/main" xmlns:ma14="http://schemas.microsoft.com/office/mac/drawingml/2011/main" val="1"/>
             </a:ext>
           </a:extLst>
         </p:spPr>
@@ -4178,7 +4178,7 @@
         </p:nvSpPr>
         <p:spPr>
           <a:xfrm>
-            <a:off x="3529644" y="5100005"/>
+            <a:off x="3529644" y="7597027"/>
             <a:ext cx="3240000" cy="2572418"/>
           </a:xfrm>
           <a:prstGeom prst="rect">
@@ -4198,7 +4198,7 @@
           <a:effectLst/>
           <a:extLst>
             <a:ext uri="{C572A759-6A51-4108-AA02-DFA0A04FC94B}">
-              <ma14:wrappingTextBoxFlag xmlns:ma14="http://schemas.microsoft.com/office/mac/drawingml/2011/main" xmlns:a14="http://schemas.microsoft.com/office/drawing/2010/main" xmlns:m="http://schemas.openxmlformats.org/officeDocument/2006/math" xmlns="" val="1"/>
+              <ma14:wrappingTextBoxFlag xmlns="" xmlns:m="http://schemas.openxmlformats.org/officeDocument/2006/math" xmlns:a14="http://schemas.microsoft.com/office/drawing/2010/main" xmlns:ma14="http://schemas.microsoft.com/office/mac/drawingml/2011/main" val="1"/>
             </a:ext>
           </a:extLst>
         </p:spPr>
@@ -4800,7 +4800,7 @@
         </p:nvSpPr>
         <p:spPr>
           <a:xfrm>
-            <a:off x="9426688" y="1530350"/>
+            <a:off x="9426688" y="4185638"/>
             <a:ext cx="4264736" cy="0"/>
           </a:xfrm>
           <a:prstGeom prst="line">
@@ -4853,7 +4853,7 @@
           </a:ln>
           <a:extLst>
             <a:ext uri="{C572A759-6A51-4108-AA02-DFA0A04FC94B}">
-              <ma14:wrappingTextBoxFlag xmlns:ma14="http://schemas.microsoft.com/office/mac/drawingml/2011/main" xmlns:a14="http://schemas.microsoft.com/office/drawing/2010/main" xmlns:m="http://schemas.openxmlformats.org/officeDocument/2006/math" xmlns="" val="1"/>
+              <ma14:wrappingTextBoxFlag xmlns="" xmlns:m="http://schemas.openxmlformats.org/officeDocument/2006/math" xmlns:a14="http://schemas.microsoft.com/office/drawing/2010/main" xmlns:ma14="http://schemas.microsoft.com/office/mac/drawingml/2011/main" val="1"/>
             </a:ext>
           </a:extLst>
         </p:spPr>
@@ -4906,7 +4906,7 @@
           </a:ln>
           <a:extLst>
             <a:ext uri="{C572A759-6A51-4108-AA02-DFA0A04FC94B}">
-              <ma14:wrappingTextBoxFlag xmlns:ma14="http://schemas.microsoft.com/office/mac/drawingml/2011/main" xmlns:a14="http://schemas.microsoft.com/office/drawing/2010/main" xmlns:m="http://schemas.openxmlformats.org/officeDocument/2006/math" xmlns="" val="1"/>
+              <ma14:wrappingTextBoxFlag xmlns="" xmlns:m="http://schemas.openxmlformats.org/officeDocument/2006/math" xmlns:a14="http://schemas.microsoft.com/office/drawing/2010/main" xmlns:ma14="http://schemas.microsoft.com/office/mac/drawingml/2011/main" val="1"/>
             </a:ext>
           </a:extLst>
         </p:spPr>
@@ -5038,11 +5038,10 @@
               <a:t> •  Updated: 20</a:t>
             </a:r>
             <a:r>
-              <a:rPr lang="nl-NL" dirty="0"/>
-              <a:t>23</a:t>
-            </a:r>
-            <a:r>
-              <a:rPr dirty="0"/>
+              <a:rPr lang="nl-NL"/>
+              <a:t>24</a:t>
+            </a:r>
+            <a:r>
               <a:t>-</a:t>
             </a:r>
             <a:r>
@@ -5072,7 +5071,7 @@
           </a:ln>
           <a:extLst>
             <a:ext uri="{C572A759-6A51-4108-AA02-DFA0A04FC94B}">
-              <ma14:wrappingTextBoxFlag xmlns:ma14="http://schemas.microsoft.com/office/mac/drawingml/2011/main" xmlns:a14="http://schemas.microsoft.com/office/drawing/2010/main" xmlns:m="http://schemas.openxmlformats.org/officeDocument/2006/math" xmlns="" val="1"/>
+              <ma14:wrappingTextBoxFlag xmlns="" xmlns:m="http://schemas.openxmlformats.org/officeDocument/2006/math" xmlns:a14="http://schemas.microsoft.com/office/drawing/2010/main" xmlns:ma14="http://schemas.microsoft.com/office/mac/drawingml/2011/main" val="1"/>
             </a:ext>
           </a:extLst>
         </p:spPr>
@@ -5676,7 +5675,7 @@
         </p:nvSpPr>
         <p:spPr>
           <a:xfrm>
-            <a:off x="3402328" y="1530350"/>
+            <a:off x="3402328" y="4185638"/>
             <a:ext cx="7110861" cy="0"/>
           </a:xfrm>
           <a:prstGeom prst="line">
@@ -5718,7 +5717,7 @@
         </p:nvSpPr>
         <p:spPr>
           <a:xfrm>
-            <a:off x="3511385" y="2352958"/>
+            <a:off x="3511385" y="4955491"/>
             <a:ext cx="6653592" cy="2583191"/>
           </a:xfrm>
           <a:prstGeom prst="rect">
@@ -5729,7 +5728,7 @@
           </a:ln>
           <a:extLst>
             <a:ext uri="{C572A759-6A51-4108-AA02-DFA0A04FC94B}">
-              <ma14:wrappingTextBoxFlag xmlns:ma14="http://schemas.microsoft.com/office/mac/drawingml/2011/main" xmlns:a14="http://schemas.microsoft.com/office/drawing/2010/main" xmlns:m="http://schemas.openxmlformats.org/officeDocument/2006/math" xmlns="" val="1"/>
+              <ma14:wrappingTextBoxFlag xmlns="" xmlns:m="http://schemas.openxmlformats.org/officeDocument/2006/math" xmlns:a14="http://schemas.microsoft.com/office/drawing/2010/main" xmlns:ma14="http://schemas.microsoft.com/office/mac/drawingml/2011/main" val="1"/>
             </a:ext>
           </a:extLst>
         </p:spPr>
@@ -6295,7 +6294,7 @@
         </p:nvSpPr>
         <p:spPr>
           <a:xfrm>
-            <a:off x="10503567" y="2352958"/>
+            <a:off x="10503567" y="4955491"/>
             <a:ext cx="3143104" cy="1495200"/>
           </a:xfrm>
           <a:prstGeom prst="rect">
@@ -6317,7 +6316,7 @@
           <a:effectLst/>
           <a:extLst>
             <a:ext uri="{C572A759-6A51-4108-AA02-DFA0A04FC94B}">
-              <ma14:wrappingTextBoxFlag xmlns:ma14="http://schemas.microsoft.com/office/mac/drawingml/2011/main" xmlns:a14="http://schemas.microsoft.com/office/drawing/2010/main" xmlns:m="http://schemas.openxmlformats.org/officeDocument/2006/math" xmlns="" val="1"/>
+              <ma14:wrappingTextBoxFlag xmlns="" xmlns:m="http://schemas.openxmlformats.org/officeDocument/2006/math" xmlns:a14="http://schemas.microsoft.com/office/drawing/2010/main" xmlns:ma14="http://schemas.microsoft.com/office/mac/drawingml/2011/main" val="1"/>
             </a:ext>
           </a:extLst>
         </p:spPr>
@@ -6816,7 +6815,7 @@
         </p:nvSpPr>
         <p:spPr>
           <a:xfrm>
-            <a:off x="3506393" y="1776562"/>
+            <a:off x="3506393" y="4379095"/>
             <a:ext cx="6538649" cy="277127"/>
           </a:xfrm>
           <a:prstGeom prst="rect">
@@ -6827,7 +6826,7 @@
           </a:ln>
           <a:extLst>
             <a:ext uri="{C572A759-6A51-4108-AA02-DFA0A04FC94B}">
-              <ma14:wrappingTextBoxFlag xmlns:ma14="http://schemas.microsoft.com/office/mac/drawingml/2011/main" xmlns:a14="http://schemas.microsoft.com/office/drawing/2010/main" xmlns:m="http://schemas.openxmlformats.org/officeDocument/2006/math" xmlns="" val="1"/>
+              <ma14:wrappingTextBoxFlag xmlns="" xmlns:m="http://schemas.openxmlformats.org/officeDocument/2006/math" xmlns:a14="http://schemas.microsoft.com/office/drawing/2010/main" xmlns:ma14="http://schemas.microsoft.com/office/mac/drawingml/2011/main" val="1"/>
             </a:ext>
           </a:extLst>
         </p:spPr>
@@ -7000,41 +6999,6 @@
           </a:p>
         </p:txBody>
       </p:sp>
-      <p:pic>
-        <p:nvPicPr>
-          <p:cNvPr id="5" name="Picture 4">
-            <a:extLst>
-              <a:ext uri="{FF2B5EF4-FFF2-40B4-BE49-F238E27FC236}">
-                <a16:creationId xmlns:a16="http://schemas.microsoft.com/office/drawing/2014/main" id="{9D598E9F-ACC8-44EF-92E4-287D4B9B8AE0}"/>
-              </a:ext>
-            </a:extLst>
-          </p:cNvPr>
-          <p:cNvPicPr>
-            <a:picLocks noChangeAspect="1"/>
-          </p:cNvPicPr>
-          <p:nvPr/>
-        </p:nvPicPr>
-        <p:blipFill>
-          <a:blip r:embed="rId5">
-            <a:extLst>
-              <a:ext uri="{28A0092B-C50C-407E-A947-70E740481C1C}">
-                <a14:useLocalDpi xmlns:a14="http://schemas.microsoft.com/office/drawing/2010/main" val="0"/>
-              </a:ext>
-            </a:extLst>
-          </a:blip>
-          <a:srcRect/>
-          <a:stretch/>
-        </p:blipFill>
-        <p:spPr>
-          <a:xfrm>
-            <a:off x="11906251" y="181433"/>
-            <a:ext cx="1561260" cy="1796389"/>
-          </a:xfrm>
-          <a:prstGeom prst="rect">
-            <a:avLst/>
-          </a:prstGeom>
-        </p:spPr>
-      </p:pic>
       <p:sp>
         <p:nvSpPr>
           <p:cNvPr id="109" name="SUBTITLE">
@@ -7049,7 +7013,7 @@
         </p:nvSpPr>
         <p:spPr>
           <a:xfrm>
-            <a:off x="3529644" y="2069607"/>
+            <a:off x="3529644" y="4672140"/>
             <a:ext cx="1978106" cy="210314"/>
           </a:xfrm>
           <a:prstGeom prst="rect">
@@ -7063,7 +7027,7 @@
           <a:effectLst/>
           <a:extLst>
             <a:ext uri="{C572A759-6A51-4108-AA02-DFA0A04FC94B}">
-              <ma14:wrappingTextBoxFlag xmlns="" xmlns:m="http://schemas.openxmlformats.org/officeDocument/2006/math" xmlns:a14="http://schemas.microsoft.com/office/drawing/2010/main" xmlns:ma14="http://schemas.microsoft.com/office/mac/drawingml/2011/main" xmlns:lc="http://schemas.openxmlformats.org/drawingml/2006/lockedCanvas" val="1"/>
+              <ma14:wrappingTextBoxFlag xmlns:lc="http://schemas.openxmlformats.org/drawingml/2006/lockedCanvas" xmlns:ma14="http://schemas.microsoft.com/office/mac/drawingml/2011/main" xmlns:a14="http://schemas.microsoft.com/office/drawing/2010/main" xmlns:m="http://schemas.openxmlformats.org/officeDocument/2006/math" xmlns="" val="1"/>
             </a:ext>
           </a:extLst>
         </p:spPr>
@@ -7461,7 +7425,7 @@
           </a:ln>
           <a:extLst>
             <a:ext uri="{C572A759-6A51-4108-AA02-DFA0A04FC94B}">
-              <ma14:wrappingTextBoxFlag xmlns:ma14="http://schemas.microsoft.com/office/mac/drawingml/2011/main" xmlns:a14="http://schemas.microsoft.com/office/drawing/2010/main" xmlns:m="http://schemas.openxmlformats.org/officeDocument/2006/math" xmlns="" val="1"/>
+              <ma14:wrappingTextBoxFlag xmlns="" xmlns:m="http://schemas.openxmlformats.org/officeDocument/2006/math" xmlns:a14="http://schemas.microsoft.com/office/drawing/2010/main" xmlns:ma14="http://schemas.microsoft.com/office/mac/drawingml/2011/main" val="1"/>
             </a:ext>
           </a:extLst>
         </p:spPr>
@@ -7525,7 +7489,7 @@
           </a:ln>
           <a:extLst>
             <a:ext uri="{C572A759-6A51-4108-AA02-DFA0A04FC94B}">
-              <ma14:wrappingTextBoxFlag xmlns:ma14="http://schemas.microsoft.com/office/mac/drawingml/2011/main" xmlns:a14="http://schemas.microsoft.com/office/drawing/2010/main" xmlns:m="http://schemas.openxmlformats.org/officeDocument/2006/math" xmlns="" val="1"/>
+              <ma14:wrappingTextBoxFlag xmlns="" xmlns:m="http://schemas.openxmlformats.org/officeDocument/2006/math" xmlns:a14="http://schemas.microsoft.com/office/drawing/2010/main" xmlns:ma14="http://schemas.microsoft.com/office/mac/drawingml/2011/main" val="1"/>
             </a:ext>
           </a:extLst>
         </p:spPr>
@@ -7949,7 +7913,7 @@
           </a:ln>
           <a:extLst>
             <a:ext uri="{C572A759-6A51-4108-AA02-DFA0A04FC94B}">
-              <ma14:wrappingTextBoxFlag xmlns:ma14="http://schemas.microsoft.com/office/mac/drawingml/2011/main" xmlns:a14="http://schemas.microsoft.com/office/drawing/2010/main" xmlns:m="http://schemas.openxmlformats.org/officeDocument/2006/math" xmlns="" val="1"/>
+              <ma14:wrappingTextBoxFlag xmlns="" xmlns:m="http://schemas.openxmlformats.org/officeDocument/2006/math" xmlns:a14="http://schemas.microsoft.com/office/drawing/2010/main" xmlns:ma14="http://schemas.microsoft.com/office/mac/drawingml/2011/main" val="1"/>
             </a:ext>
           </a:extLst>
         </p:spPr>
@@ -8013,7 +7977,7 @@
           </a:ln>
           <a:extLst>
             <a:ext uri="{C572A759-6A51-4108-AA02-DFA0A04FC94B}">
-              <ma14:wrappingTextBoxFlag xmlns:ma14="http://schemas.microsoft.com/office/mac/drawingml/2011/main" xmlns:a14="http://schemas.microsoft.com/office/drawing/2010/main" xmlns:m="http://schemas.openxmlformats.org/officeDocument/2006/math" xmlns="" val="1"/>
+              <ma14:wrappingTextBoxFlag xmlns="" xmlns:m="http://schemas.openxmlformats.org/officeDocument/2006/math" xmlns:a14="http://schemas.microsoft.com/office/drawing/2010/main" xmlns:ma14="http://schemas.microsoft.com/office/mac/drawingml/2011/main" val="1"/>
             </a:ext>
           </a:extLst>
         </p:spPr>
@@ -8375,7 +8339,7 @@
         </p:nvSpPr>
         <p:spPr>
           <a:xfrm>
-            <a:off x="10506132" y="5093339"/>
+            <a:off x="10506132" y="7590361"/>
             <a:ext cx="3240000" cy="2572418"/>
           </a:xfrm>
           <a:prstGeom prst="rect">
@@ -8397,7 +8361,7 @@
           <a:effectLst/>
           <a:extLst>
             <a:ext uri="{C572A759-6A51-4108-AA02-DFA0A04FC94B}">
-              <ma14:wrappingTextBoxFlag xmlns:ma14="http://schemas.microsoft.com/office/mac/drawingml/2011/main" xmlns:a14="http://schemas.microsoft.com/office/drawing/2010/main" xmlns:m="http://schemas.openxmlformats.org/officeDocument/2006/math" xmlns="" val="1"/>
+              <ma14:wrappingTextBoxFlag xmlns="" xmlns:m="http://schemas.openxmlformats.org/officeDocument/2006/math" xmlns:a14="http://schemas.microsoft.com/office/drawing/2010/main" xmlns:ma14="http://schemas.microsoft.com/office/mac/drawingml/2011/main" val="1"/>
             </a:ext>
           </a:extLst>
         </p:spPr>
@@ -8871,14 +8835,14 @@
           <p:nvPr/>
         </p:nvPicPr>
         <p:blipFill>
-          <a:blip r:embed="rId6"/>
+          <a:blip r:embed="rId5"/>
           <a:stretch>
             <a:fillRect/>
           </a:stretch>
         </p:blipFill>
         <p:spPr>
           <a:xfrm>
-            <a:off x="3621831" y="5541404"/>
+            <a:off x="3621831" y="8038426"/>
             <a:ext cx="3038400" cy="2063258"/>
           </a:xfrm>
           <a:prstGeom prst="rect">
@@ -8901,14 +8865,14 @@
           <p:nvPr/>
         </p:nvPicPr>
         <p:blipFill>
-          <a:blip r:embed="rId7"/>
+          <a:blip r:embed="rId6"/>
           <a:stretch>
             <a:fillRect/>
           </a:stretch>
         </p:blipFill>
         <p:spPr>
           <a:xfrm>
-            <a:off x="7118688" y="5541404"/>
+            <a:off x="7118688" y="8038426"/>
             <a:ext cx="3038400" cy="2063258"/>
           </a:xfrm>
           <a:prstGeom prst="rect">
@@ -8931,14 +8895,14 @@
           <p:nvPr/>
         </p:nvPicPr>
         <p:blipFill>
-          <a:blip r:embed="rId8"/>
+          <a:blip r:embed="rId7"/>
           <a:stretch>
             <a:fillRect/>
           </a:stretch>
         </p:blipFill>
         <p:spPr>
           <a:xfrm>
-            <a:off x="10606932" y="5541404"/>
+            <a:off x="10606932" y="8038426"/>
             <a:ext cx="3038400" cy="2063258"/>
           </a:xfrm>
           <a:prstGeom prst="rect">
@@ -8948,10 +8912,10 @@
       </p:pic>
       <p:sp>
         <p:nvSpPr>
-          <p:cNvPr id="7" name="Line">
+          <p:cNvPr id="6" name="Line">
             <a:extLst>
               <a:ext uri="{FF2B5EF4-FFF2-40B4-BE49-F238E27FC236}">
-                <a16:creationId xmlns:a16="http://schemas.microsoft.com/office/drawing/2014/main" id="{4B498669-295C-A2C4-092F-A27F40CFD778}"/>
+                <a16:creationId xmlns:a16="http://schemas.microsoft.com/office/drawing/2014/main" id="{678CFD7A-56FD-9EF8-0C93-AA5DAA3F8864}"/>
               </a:ext>
             </a:extLst>
           </p:cNvPr>
@@ -8960,7 +8924,7 @@
         </p:nvSpPr>
         <p:spPr>
           <a:xfrm>
-            <a:off x="9426687" y="7870236"/>
+            <a:off x="9426688" y="1530350"/>
             <a:ext cx="4264736" cy="0"/>
           </a:xfrm>
           <a:prstGeom prst="line">
@@ -8996,10 +8960,10 @@
       </p:sp>
       <p:sp>
         <p:nvSpPr>
-          <p:cNvPr id="8" name="Line">
+          <p:cNvPr id="9" name="Line">
             <a:extLst>
               <a:ext uri="{FF2B5EF4-FFF2-40B4-BE49-F238E27FC236}">
-                <a16:creationId xmlns:a16="http://schemas.microsoft.com/office/drawing/2014/main" id="{BF00C41A-3388-B285-476C-D8D5A604DF11}"/>
+                <a16:creationId xmlns:a16="http://schemas.microsoft.com/office/drawing/2014/main" id="{86A32009-DFBD-347A-F7F4-7A9D73546461}"/>
               </a:ext>
             </a:extLst>
           </p:cNvPr>
@@ -9008,7 +8972,7 @@
         </p:nvSpPr>
         <p:spPr>
           <a:xfrm>
-            <a:off x="3402327" y="7870236"/>
+            <a:off x="3402328" y="1530350"/>
             <a:ext cx="7110861" cy="0"/>
           </a:xfrm>
           <a:prstGeom prst="line">
@@ -9042,6 +9006,1233 @@
           </a:p>
         </p:txBody>
       </p:sp>
+      <p:sp>
+        <p:nvSpPr>
+          <p:cNvPr id="10" name="Use headers, colors, and/or backgrounds to separate or group together sections.">
+            <a:extLst>
+              <a:ext uri="{FF2B5EF4-FFF2-40B4-BE49-F238E27FC236}">
+                <a16:creationId xmlns:a16="http://schemas.microsoft.com/office/drawing/2014/main" id="{F9D20876-267D-5D71-E529-D98F55D2C3E7}"/>
+              </a:ext>
+            </a:extLst>
+          </p:cNvPr>
+          <p:cNvSpPr txBox="1"/>
+          <p:nvPr/>
+        </p:nvSpPr>
+        <p:spPr>
+          <a:xfrm>
+            <a:off x="3505520" y="2223999"/>
+            <a:ext cx="6653592" cy="1802977"/>
+          </a:xfrm>
+          <a:prstGeom prst="rect">
+            <a:avLst/>
+          </a:prstGeom>
+          <a:ln w="12700">
+            <a:miter lim="400000"/>
+          </a:ln>
+          <a:extLst>
+            <a:ext uri="{C572A759-6A51-4108-AA02-DFA0A04FC94B}">
+              <ma14:wrappingTextBoxFlag xmlns="" xmlns:m="http://schemas.openxmlformats.org/officeDocument/2006/math" xmlns:a14="http://schemas.microsoft.com/office/drawing/2010/main" xmlns:ma14="http://schemas.microsoft.com/office/mac/drawingml/2011/main" val="1"/>
+            </a:ext>
+          </a:extLst>
+        </p:spPr>
+        <p:txBody>
+          <a:bodyPr wrap="square" lIns="54570" tIns="54570" rIns="54570" bIns="54570">
+            <a:spAutoFit/>
+          </a:bodyPr>
+          <a:lstStyle/>
+          <a:p>
+            <a:pPr algn="just">
+              <a:lnSpc>
+                <a:spcPct val="90000"/>
+              </a:lnSpc>
+              <a:spcBef>
+                <a:spcPts val="300"/>
+              </a:spcBef>
+              <a:buClr>
+                <a:schemeClr val="accent4">
+                  <a:hueOff val="384618"/>
+                  <a:satOff val="3869"/>
+                  <a:lumOff val="5802"/>
+                </a:schemeClr>
+              </a:buClr>
+              <a:defRPr b="0">
+                <a:solidFill>
+                  <a:srgbClr val="000000"/>
+                </a:solidFill>
+                <a:latin typeface="+mn-lt"/>
+                <a:ea typeface="+mn-ea"/>
+                <a:cs typeface="+mn-cs"/>
+                <a:sym typeface="Source Sans Pro Light"/>
+              </a:defRPr>
+            </a:pPr>
+            <a:r>
+              <a:rPr lang="en-US" b="0" i="0" dirty="0">
+                <a:solidFill>
+                  <a:srgbClr val="000000"/>
+                </a:solidFill>
+                <a:effectLst/>
+                <a:latin typeface="+mn-lt"/>
+              </a:rPr>
+              <a:t>This function is designed to help auditors to select the appropriate fairness metric to perform algorithm auditing. It presents the user with four questions in an easily understandable manner, requiring no statistical background or in-depth knowledge of the fairness measures. The path through the decision-making workflow can be visualized using the </a:t>
+            </a:r>
+            <a:r>
+              <a:rPr lang="en-US" b="0" dirty="0">
+                <a:solidFill>
+                  <a:schemeClr val="accent1"/>
+                </a:solidFill>
+                <a:latin typeface="Courier New" panose="02070309020205020404" pitchFamily="49" charset="0"/>
+                <a:cs typeface="Courier New" panose="02070309020205020404" pitchFamily="49" charset="0"/>
+              </a:rPr>
+              <a:t>plot</a:t>
+            </a:r>
+            <a:r>
+              <a:rPr lang="en-US" b="0" i="0" dirty="0">
+                <a:solidFill>
+                  <a:srgbClr val="000000"/>
+                </a:solidFill>
+                <a:effectLst/>
+                <a:latin typeface="+mn-lt"/>
+              </a:rPr>
+              <a:t> function.</a:t>
+            </a:r>
+          </a:p>
+          <a:p>
+            <a:pPr algn="just">
+              <a:lnSpc>
+                <a:spcPct val="90000"/>
+              </a:lnSpc>
+              <a:spcBef>
+                <a:spcPts val="300"/>
+              </a:spcBef>
+              <a:buClr>
+                <a:schemeClr val="accent4">
+                  <a:hueOff val="384618"/>
+                  <a:satOff val="3869"/>
+                  <a:lumOff val="5802"/>
+                </a:schemeClr>
+              </a:buClr>
+              <a:defRPr b="0">
+                <a:solidFill>
+                  <a:srgbClr val="000000"/>
+                </a:solidFill>
+                <a:latin typeface="+mn-lt"/>
+                <a:ea typeface="+mn-ea"/>
+                <a:cs typeface="+mn-cs"/>
+                <a:sym typeface="Source Sans Pro Light"/>
+              </a:defRPr>
+            </a:pPr>
+            <a:endParaRPr lang="en-US" b="0" dirty="0">
+              <a:solidFill>
+                <a:srgbClr val="000000"/>
+              </a:solidFill>
+              <a:latin typeface="+mn-lt"/>
+            </a:endParaRPr>
+          </a:p>
+          <a:p>
+            <a:pPr marL="171450" indent="-171450" algn="just">
+              <a:lnSpc>
+                <a:spcPct val="90000"/>
+              </a:lnSpc>
+              <a:spcBef>
+                <a:spcPts val="300"/>
+              </a:spcBef>
+              <a:buClr>
+                <a:schemeClr val="accent4">
+                  <a:hueOff val="384618"/>
+                  <a:satOff val="3869"/>
+                  <a:lumOff val="5802"/>
+                </a:schemeClr>
+              </a:buClr>
+              <a:buFont typeface="Arial" panose="020B0604020202020204" pitchFamily="34" charset="0"/>
+              <a:buChar char="•"/>
+              <a:defRPr b="0">
+                <a:solidFill>
+                  <a:srgbClr val="000000"/>
+                </a:solidFill>
+                <a:latin typeface="+mn-lt"/>
+                <a:ea typeface="+mn-ea"/>
+                <a:cs typeface="+mn-cs"/>
+                <a:sym typeface="Source Sans Pro Light"/>
+              </a:defRPr>
+            </a:pPr>
+            <a:r>
+              <a:rPr lang="en-US" b="0" dirty="0">
+                <a:solidFill>
+                  <a:schemeClr val="accent1"/>
+                </a:solidFill>
+                <a:latin typeface="Courier New" panose="02070309020205020404" pitchFamily="49" charset="0"/>
+                <a:cs typeface="Courier New" panose="02070309020205020404" pitchFamily="49" charset="0"/>
+              </a:rPr>
+              <a:t>q1:</a:t>
+            </a:r>
+            <a:r>
+              <a:rPr lang="en-US" b="0" dirty="0">
+                <a:solidFill>
+                  <a:schemeClr val="tx1">
+                    <a:lumMod val="50000"/>
+                  </a:schemeClr>
+                </a:solidFill>
+                <a:latin typeface="+mn-lt"/>
+              </a:rPr>
+              <a:t> Is the information on the true values of the classification relevant in your context? </a:t>
+            </a:r>
+          </a:p>
+          <a:p>
+            <a:pPr marL="171450" indent="-171450" algn="just">
+              <a:lnSpc>
+                <a:spcPct val="90000"/>
+              </a:lnSpc>
+              <a:spcBef>
+                <a:spcPts val="300"/>
+              </a:spcBef>
+              <a:buClr>
+                <a:schemeClr val="accent4">
+                  <a:hueOff val="384618"/>
+                  <a:satOff val="3869"/>
+                  <a:lumOff val="5802"/>
+                </a:schemeClr>
+              </a:buClr>
+              <a:buFont typeface="Arial" panose="020B0604020202020204" pitchFamily="34" charset="0"/>
+              <a:buChar char="•"/>
+              <a:defRPr b="0">
+                <a:solidFill>
+                  <a:srgbClr val="000000"/>
+                </a:solidFill>
+                <a:latin typeface="+mn-lt"/>
+                <a:ea typeface="+mn-ea"/>
+                <a:cs typeface="+mn-cs"/>
+                <a:sym typeface="Source Sans Pro Light"/>
+              </a:defRPr>
+            </a:pPr>
+            <a:r>
+              <a:rPr lang="en-US" b="0" dirty="0">
+                <a:solidFill>
+                  <a:schemeClr val="accent1"/>
+                </a:solidFill>
+                <a:latin typeface="Courier New" panose="02070309020205020404" pitchFamily="49" charset="0"/>
+                <a:cs typeface="Courier New" panose="02070309020205020404" pitchFamily="49" charset="0"/>
+              </a:rPr>
+              <a:t>q2:</a:t>
+            </a:r>
+            <a:r>
+              <a:rPr lang="en-US" b="0" dirty="0">
+                <a:solidFill>
+                  <a:schemeClr val="tx1">
+                    <a:lumMod val="50000"/>
+                  </a:schemeClr>
+                </a:solidFill>
+                <a:latin typeface="+mn-lt"/>
+              </a:rPr>
+              <a:t> In what type of classification are you interested? </a:t>
+            </a:r>
+            <a:endParaRPr lang="en-US" b="0" dirty="0">
+              <a:solidFill>
+                <a:schemeClr val="tx1">
+                  <a:lumMod val="50000"/>
+                </a:schemeClr>
+              </a:solidFill>
+              <a:latin typeface="+mn-lt"/>
+              <a:cs typeface="Courier New" panose="02070309020205020404" pitchFamily="49" charset="0"/>
+            </a:endParaRPr>
+          </a:p>
+          <a:p>
+            <a:pPr marL="171450" indent="-171450" algn="just">
+              <a:lnSpc>
+                <a:spcPct val="90000"/>
+              </a:lnSpc>
+              <a:spcBef>
+                <a:spcPts val="300"/>
+              </a:spcBef>
+              <a:buClr>
+                <a:schemeClr val="accent4">
+                  <a:hueOff val="384618"/>
+                  <a:satOff val="3869"/>
+                  <a:lumOff val="5802"/>
+                </a:schemeClr>
+              </a:buClr>
+              <a:buFont typeface="Arial" panose="020B0604020202020204" pitchFamily="34" charset="0"/>
+              <a:buChar char="•"/>
+              <a:defRPr b="0">
+                <a:solidFill>
+                  <a:srgbClr val="000000"/>
+                </a:solidFill>
+                <a:latin typeface="+mn-lt"/>
+                <a:ea typeface="+mn-ea"/>
+                <a:cs typeface="+mn-cs"/>
+                <a:sym typeface="Source Sans Pro Light"/>
+              </a:defRPr>
+            </a:pPr>
+            <a:r>
+              <a:rPr lang="en-US" b="0" dirty="0">
+                <a:solidFill>
+                  <a:schemeClr val="accent1"/>
+                </a:solidFill>
+                <a:latin typeface="Courier New" panose="02070309020205020404" pitchFamily="49" charset="0"/>
+                <a:cs typeface="Courier New" panose="02070309020205020404" pitchFamily="49" charset="0"/>
+              </a:rPr>
+              <a:t>q3:</a:t>
+            </a:r>
+            <a:r>
+              <a:rPr lang="en-US" b="0" dirty="0">
+                <a:solidFill>
+                  <a:schemeClr val="tx1">
+                    <a:lumMod val="50000"/>
+                  </a:schemeClr>
+                </a:solidFill>
+                <a:latin typeface="+mn-lt"/>
+              </a:rPr>
+              <a:t> Can the negative class be considered as everything not positive or is it well-defined? </a:t>
+            </a:r>
+            <a:endParaRPr lang="en-US" b="0" dirty="0">
+              <a:solidFill>
+                <a:schemeClr val="accent1"/>
+              </a:solidFill>
+              <a:latin typeface="Courier New" panose="02070309020205020404" pitchFamily="49" charset="0"/>
+              <a:cs typeface="Courier New" panose="02070309020205020404" pitchFamily="49" charset="0"/>
+            </a:endParaRPr>
+          </a:p>
+          <a:p>
+            <a:pPr marL="171450" indent="-171450" algn="just">
+              <a:lnSpc>
+                <a:spcPct val="90000"/>
+              </a:lnSpc>
+              <a:spcBef>
+                <a:spcPts val="300"/>
+              </a:spcBef>
+              <a:buClr>
+                <a:schemeClr val="accent4">
+                  <a:hueOff val="384618"/>
+                  <a:satOff val="3869"/>
+                  <a:lumOff val="5802"/>
+                </a:schemeClr>
+              </a:buClr>
+              <a:buFont typeface="Arial" panose="020B0604020202020204" pitchFamily="34" charset="0"/>
+              <a:buChar char="•"/>
+              <a:defRPr b="0">
+                <a:solidFill>
+                  <a:srgbClr val="000000"/>
+                </a:solidFill>
+                <a:latin typeface="+mn-lt"/>
+                <a:ea typeface="+mn-ea"/>
+                <a:cs typeface="+mn-cs"/>
+                <a:sym typeface="Source Sans Pro Light"/>
+              </a:defRPr>
+            </a:pPr>
+            <a:r>
+              <a:rPr lang="en-US" b="0" dirty="0">
+                <a:solidFill>
+                  <a:schemeClr val="accent1"/>
+                </a:solidFill>
+                <a:latin typeface="Courier New" panose="02070309020205020404" pitchFamily="49" charset="0"/>
+                <a:cs typeface="Courier New" panose="02070309020205020404" pitchFamily="49" charset="0"/>
+              </a:rPr>
+              <a:t>q4:</a:t>
+            </a:r>
+            <a:r>
+              <a:rPr lang="en-US" b="0" dirty="0">
+                <a:solidFill>
+                  <a:schemeClr val="tx1">
+                    <a:lumMod val="50000"/>
+                  </a:schemeClr>
+                </a:solidFill>
+                <a:latin typeface="+mn-lt"/>
+              </a:rPr>
+              <a:t> What are the errors with the highest cost? </a:t>
+            </a:r>
+            <a:endParaRPr lang="en-US" b="0" dirty="0">
+              <a:solidFill>
+                <a:schemeClr val="tx1">
+                  <a:lumMod val="50000"/>
+                </a:schemeClr>
+              </a:solidFill>
+              <a:latin typeface="+mn-lt"/>
+              <a:cs typeface="Courier New" panose="02070309020205020404" pitchFamily="49" charset="0"/>
+            </a:endParaRPr>
+          </a:p>
+        </p:txBody>
+      </p:sp>
+      <p:sp>
+        <p:nvSpPr>
+          <p:cNvPr id="11" name="ggplot(mpg, aes(hwy, cty)) +…">
+            <a:extLst>
+              <a:ext uri="{FF2B5EF4-FFF2-40B4-BE49-F238E27FC236}">
+                <a16:creationId xmlns:a16="http://schemas.microsoft.com/office/drawing/2014/main" id="{64D7C6A7-2F3D-C408-70E9-6CE2E09415E4}"/>
+              </a:ext>
+            </a:extLst>
+          </p:cNvPr>
+          <p:cNvSpPr txBox="1"/>
+          <p:nvPr/>
+        </p:nvSpPr>
+        <p:spPr>
+          <a:xfrm>
+            <a:off x="10497702" y="2296566"/>
+            <a:ext cx="3143104" cy="1033536"/>
+          </a:xfrm>
+          <a:prstGeom prst="rect">
+            <a:avLst/>
+          </a:prstGeom>
+          <a:solidFill>
+            <a:schemeClr val="accent1">
+              <a:lumMod val="20000"/>
+              <a:lumOff val="80000"/>
+              <a:alpha val="50000"/>
+            </a:schemeClr>
+          </a:solidFill>
+          <a:ln w="12700">
+            <a:solidFill>
+              <a:schemeClr val="bg1"/>
+            </a:solidFill>
+            <a:miter lim="400000"/>
+          </a:ln>
+          <a:effectLst/>
+          <a:extLst>
+            <a:ext uri="{C572A759-6A51-4108-AA02-DFA0A04FC94B}">
+              <ma14:wrappingTextBoxFlag xmlns="" xmlns:m="http://schemas.openxmlformats.org/officeDocument/2006/math" xmlns:a14="http://schemas.microsoft.com/office/drawing/2010/main" xmlns:ma14="http://schemas.microsoft.com/office/mac/drawingml/2011/main" val="1"/>
+            </a:ext>
+          </a:extLst>
+        </p:spPr>
+        <p:txBody>
+          <a:bodyPr wrap="square" lIns="54570" tIns="54570" rIns="54570" bIns="54570" anchor="ctr">
+            <a:spAutoFit/>
+          </a:bodyPr>
+          <a:lstStyle/>
+          <a:p>
+            <a:pPr>
+              <a:spcBef>
+                <a:spcPts val="0"/>
+              </a:spcBef>
+              <a:defRPr b="0">
+                <a:solidFill>
+                  <a:srgbClr val="000000"/>
+                </a:solidFill>
+                <a:latin typeface="Menlo"/>
+                <a:ea typeface="Menlo"/>
+                <a:cs typeface="Menlo"/>
+                <a:sym typeface="Menlo"/>
+              </a:defRPr>
+            </a:pPr>
+            <a:r>
+              <a:rPr lang="nl-NL" sz="1000" dirty="0" err="1">
+                <a:solidFill>
+                  <a:schemeClr val="tx1">
+                    <a:lumMod val="50000"/>
+                  </a:schemeClr>
+                </a:solidFill>
+                <a:latin typeface="Courier New" panose="02070309020205020404" pitchFamily="49" charset="0"/>
+                <a:cs typeface="Courier New" panose="02070309020205020404" pitchFamily="49" charset="0"/>
+              </a:rPr>
+              <a:t>fairness_selection</a:t>
+            </a:r>
+            <a:r>
+              <a:rPr lang="nl-NL" sz="1000" dirty="0">
+                <a:solidFill>
+                  <a:schemeClr val="tx1">
+                    <a:lumMod val="50000"/>
+                  </a:schemeClr>
+                </a:solidFill>
+                <a:latin typeface="Courier New" panose="02070309020205020404" pitchFamily="49" charset="0"/>
+                <a:cs typeface="Courier New" panose="02070309020205020404" pitchFamily="49" charset="0"/>
+              </a:rPr>
+              <a:t>(</a:t>
+            </a:r>
+          </a:p>
+          <a:p>
+            <a:pPr>
+              <a:spcBef>
+                <a:spcPts val="0"/>
+              </a:spcBef>
+              <a:defRPr b="0">
+                <a:solidFill>
+                  <a:srgbClr val="000000"/>
+                </a:solidFill>
+                <a:latin typeface="Menlo"/>
+                <a:ea typeface="Menlo"/>
+                <a:cs typeface="Menlo"/>
+                <a:sym typeface="Menlo"/>
+              </a:defRPr>
+            </a:pPr>
+            <a:r>
+              <a:rPr lang="nl-NL" sz="1000" dirty="0">
+                <a:solidFill>
+                  <a:schemeClr val="tx1">
+                    <a:lumMod val="50000"/>
+                  </a:schemeClr>
+                </a:solidFill>
+                <a:latin typeface="Courier New" panose="02070309020205020404" pitchFamily="49" charset="0"/>
+                <a:cs typeface="Courier New" panose="02070309020205020404" pitchFamily="49" charset="0"/>
+              </a:rPr>
+              <a:t>  q1 = 1,</a:t>
+            </a:r>
+          </a:p>
+          <a:p>
+            <a:pPr>
+              <a:spcBef>
+                <a:spcPts val="0"/>
+              </a:spcBef>
+              <a:defRPr b="0">
+                <a:solidFill>
+                  <a:srgbClr val="000000"/>
+                </a:solidFill>
+                <a:latin typeface="Menlo"/>
+                <a:ea typeface="Menlo"/>
+                <a:cs typeface="Menlo"/>
+                <a:sym typeface="Menlo"/>
+              </a:defRPr>
+            </a:pPr>
+            <a:r>
+              <a:rPr lang="nl-NL" sz="1000" dirty="0">
+                <a:solidFill>
+                  <a:schemeClr val="tx1">
+                    <a:lumMod val="50000"/>
+                  </a:schemeClr>
+                </a:solidFill>
+                <a:latin typeface="Courier New" panose="02070309020205020404" pitchFamily="49" charset="0"/>
+                <a:cs typeface="Courier New" panose="02070309020205020404" pitchFamily="49" charset="0"/>
+              </a:rPr>
+              <a:t>  q2 = 1,</a:t>
+            </a:r>
+          </a:p>
+          <a:p>
+            <a:pPr>
+              <a:spcBef>
+                <a:spcPts val="0"/>
+              </a:spcBef>
+              <a:defRPr b="0">
+                <a:solidFill>
+                  <a:srgbClr val="000000"/>
+                </a:solidFill>
+                <a:latin typeface="Menlo"/>
+                <a:ea typeface="Menlo"/>
+                <a:cs typeface="Menlo"/>
+                <a:sym typeface="Menlo"/>
+              </a:defRPr>
+            </a:pPr>
+            <a:r>
+              <a:rPr lang="nl-NL" sz="1000" dirty="0">
+                <a:solidFill>
+                  <a:schemeClr val="tx1">
+                    <a:lumMod val="50000"/>
+                  </a:schemeClr>
+                </a:solidFill>
+                <a:latin typeface="Courier New" panose="02070309020205020404" pitchFamily="49" charset="0"/>
+                <a:cs typeface="Courier New" panose="02070309020205020404" pitchFamily="49" charset="0"/>
+              </a:rPr>
+              <a:t>  q3 </a:t>
+            </a:r>
+            <a:r>
+              <a:rPr lang="nl-NL" sz="1000">
+                <a:solidFill>
+                  <a:schemeClr val="tx1">
+                    <a:lumMod val="50000"/>
+                  </a:schemeClr>
+                </a:solidFill>
+                <a:latin typeface="Courier New" panose="02070309020205020404" pitchFamily="49" charset="0"/>
+                <a:cs typeface="Courier New" panose="02070309020205020404" pitchFamily="49" charset="0"/>
+              </a:rPr>
+              <a:t>= 2,</a:t>
+            </a:r>
+            <a:endParaRPr lang="nl-NL" sz="1000" dirty="0">
+              <a:solidFill>
+                <a:schemeClr val="tx1">
+                  <a:lumMod val="50000"/>
+                </a:schemeClr>
+              </a:solidFill>
+              <a:latin typeface="Courier New" panose="02070309020205020404" pitchFamily="49" charset="0"/>
+              <a:cs typeface="Courier New" panose="02070309020205020404" pitchFamily="49" charset="0"/>
+            </a:endParaRPr>
+          </a:p>
+          <a:p>
+            <a:pPr>
+              <a:spcBef>
+                <a:spcPts val="0"/>
+              </a:spcBef>
+              <a:defRPr b="0">
+                <a:solidFill>
+                  <a:srgbClr val="000000"/>
+                </a:solidFill>
+                <a:latin typeface="Menlo"/>
+                <a:ea typeface="Menlo"/>
+                <a:cs typeface="Menlo"/>
+                <a:sym typeface="Menlo"/>
+              </a:defRPr>
+            </a:pPr>
+            <a:r>
+              <a:rPr lang="nl-NL" sz="1000" dirty="0">
+                <a:solidFill>
+                  <a:schemeClr val="tx1">
+                    <a:lumMod val="50000"/>
+                  </a:schemeClr>
+                </a:solidFill>
+                <a:latin typeface="Courier New" panose="02070309020205020404" pitchFamily="49" charset="0"/>
+                <a:cs typeface="Courier New" panose="02070309020205020404" pitchFamily="49" charset="0"/>
+              </a:rPr>
+              <a:t>  q4 = 3</a:t>
+            </a:r>
+          </a:p>
+          <a:p>
+            <a:pPr>
+              <a:spcBef>
+                <a:spcPts val="0"/>
+              </a:spcBef>
+              <a:defRPr b="0">
+                <a:solidFill>
+                  <a:srgbClr val="000000"/>
+                </a:solidFill>
+                <a:latin typeface="Menlo"/>
+                <a:ea typeface="Menlo"/>
+                <a:cs typeface="Menlo"/>
+                <a:sym typeface="Menlo"/>
+              </a:defRPr>
+            </a:pPr>
+            <a:r>
+              <a:rPr lang="nl-NL" sz="1000" dirty="0">
+                <a:solidFill>
+                  <a:schemeClr val="tx1">
+                    <a:lumMod val="50000"/>
+                  </a:schemeClr>
+                </a:solidFill>
+                <a:latin typeface="Courier New" panose="02070309020205020404" pitchFamily="49" charset="0"/>
+                <a:cs typeface="Courier New" panose="02070309020205020404" pitchFamily="49" charset="0"/>
+              </a:rPr>
+              <a:t>)</a:t>
+            </a:r>
+          </a:p>
+        </p:txBody>
+      </p:sp>
+      <p:sp>
+        <p:nvSpPr>
+          <p:cNvPr id="13" name="Layout Suggestions">
+            <a:extLst>
+              <a:ext uri="{FF2B5EF4-FFF2-40B4-BE49-F238E27FC236}">
+                <a16:creationId xmlns:a16="http://schemas.microsoft.com/office/drawing/2014/main" id="{E3E45273-1EAB-05BE-612C-9A69D838FA28}"/>
+              </a:ext>
+            </a:extLst>
+          </p:cNvPr>
+          <p:cNvSpPr txBox="1"/>
+          <p:nvPr/>
+        </p:nvSpPr>
+        <p:spPr>
+          <a:xfrm>
+            <a:off x="3500528" y="1647603"/>
+            <a:ext cx="6641242" cy="277127"/>
+          </a:xfrm>
+          <a:prstGeom prst="rect">
+            <a:avLst/>
+          </a:prstGeom>
+          <a:ln w="12700">
+            <a:miter lim="400000"/>
+          </a:ln>
+          <a:extLst>
+            <a:ext uri="{C572A759-6A51-4108-AA02-DFA0A04FC94B}">
+              <ma14:wrappingTextBoxFlag xmlns="" xmlns:m="http://schemas.openxmlformats.org/officeDocument/2006/math" xmlns:a14="http://schemas.microsoft.com/office/drawing/2010/main" xmlns:ma14="http://schemas.microsoft.com/office/mac/drawingml/2011/main" val="1"/>
+            </a:ext>
+          </a:extLst>
+        </p:spPr>
+        <p:txBody>
+          <a:bodyPr wrap="none" lIns="12700" tIns="12700" rIns="12700" bIns="12700" anchor="ctr">
+            <a:spAutoFit/>
+          </a:bodyPr>
+          <a:lstStyle/>
+          <a:p>
+            <a:pPr lvl="1" indent="0">
+              <a:lnSpc>
+                <a:spcPct val="80000"/>
+              </a:lnSpc>
+              <a:spcBef>
+                <a:spcPts val="0"/>
+              </a:spcBef>
+              <a:defRPr sz="2500" b="0">
+                <a:solidFill>
+                  <a:srgbClr val="628DB5"/>
+                </a:solidFill>
+              </a:defRPr>
+            </a:pPr>
+            <a:r>
+              <a:rPr lang="nl-NL" sz="2000" dirty="0">
+                <a:solidFill>
+                  <a:schemeClr val="tx1">
+                    <a:lumMod val="50000"/>
+                  </a:schemeClr>
+                </a:solidFill>
+              </a:rPr>
+              <a:t>Select </a:t>
+            </a:r>
+            <a:r>
+              <a:rPr lang="nl-NL" sz="2000" dirty="0" err="1">
+                <a:solidFill>
+                  <a:schemeClr val="tx1">
+                    <a:lumMod val="50000"/>
+                  </a:schemeClr>
+                </a:solidFill>
+              </a:rPr>
+              <a:t>an</a:t>
+            </a:r>
+            <a:r>
+              <a:rPr lang="nl-NL" sz="2000" dirty="0">
+                <a:solidFill>
+                  <a:schemeClr val="tx1">
+                    <a:lumMod val="50000"/>
+                  </a:schemeClr>
+                </a:solidFill>
+              </a:rPr>
+              <a:t> </a:t>
+            </a:r>
+            <a:r>
+              <a:rPr lang="nl-NL" sz="2000" dirty="0" err="1">
+                <a:solidFill>
+                  <a:schemeClr val="tx1">
+                    <a:lumMod val="50000"/>
+                  </a:schemeClr>
+                </a:solidFill>
+              </a:rPr>
+              <a:t>appropriate</a:t>
+            </a:r>
+            <a:r>
+              <a:rPr lang="nl-NL" sz="2000" dirty="0">
+                <a:solidFill>
+                  <a:schemeClr val="tx1">
+                    <a:lumMod val="50000"/>
+                  </a:schemeClr>
+                </a:solidFill>
+              </a:rPr>
+              <a:t> </a:t>
+            </a:r>
+            <a:r>
+              <a:rPr lang="nl-NL" sz="2000" dirty="0" err="1">
+                <a:solidFill>
+                  <a:schemeClr val="tx1">
+                    <a:lumMod val="50000"/>
+                  </a:schemeClr>
+                </a:solidFill>
+              </a:rPr>
+              <a:t>metric</a:t>
+            </a:r>
+            <a:r>
+              <a:rPr lang="nl-NL" sz="2000" dirty="0">
+                <a:solidFill>
+                  <a:schemeClr val="tx1">
+                    <a:lumMod val="50000"/>
+                  </a:schemeClr>
+                </a:solidFill>
+              </a:rPr>
+              <a:t> </a:t>
+            </a:r>
+            <a:r>
+              <a:rPr lang="nl-NL" sz="2000" dirty="0" err="1">
+                <a:solidFill>
+                  <a:schemeClr val="tx1">
+                    <a:lumMod val="50000"/>
+                  </a:schemeClr>
+                </a:solidFill>
+              </a:rPr>
+              <a:t>for</a:t>
+            </a:r>
+            <a:r>
+              <a:rPr lang="nl-NL" sz="2000" dirty="0">
+                <a:solidFill>
+                  <a:schemeClr val="tx1">
+                    <a:lumMod val="50000"/>
+                  </a:schemeClr>
+                </a:solidFill>
+              </a:rPr>
+              <a:t> </a:t>
+            </a:r>
+            <a:r>
+              <a:rPr lang="nl-NL" sz="2000" dirty="0" err="1">
+                <a:solidFill>
+                  <a:schemeClr val="tx1">
+                    <a:lumMod val="50000"/>
+                  </a:schemeClr>
+                </a:solidFill>
+              </a:rPr>
+              <a:t>assessing</a:t>
+            </a:r>
+            <a:r>
+              <a:rPr lang="nl-NL" sz="2000" dirty="0">
+                <a:solidFill>
+                  <a:schemeClr val="tx1">
+                    <a:lumMod val="50000"/>
+                  </a:schemeClr>
+                </a:solidFill>
+              </a:rPr>
+              <a:t> </a:t>
+            </a:r>
+            <a:r>
+              <a:rPr lang="nl-NL" sz="2000" dirty="0" err="1">
+                <a:solidFill>
+                  <a:schemeClr val="tx1">
+                    <a:lumMod val="50000"/>
+                  </a:schemeClr>
+                </a:solidFill>
+              </a:rPr>
+              <a:t>algorithmic</a:t>
+            </a:r>
+            <a:r>
+              <a:rPr lang="nl-NL" sz="2000" dirty="0">
+                <a:solidFill>
+                  <a:schemeClr val="tx1">
+                    <a:lumMod val="50000"/>
+                  </a:schemeClr>
+                </a:solidFill>
+              </a:rPr>
+              <a:t> </a:t>
+            </a:r>
+            <a:r>
+              <a:rPr lang="nl-NL" sz="2000" dirty="0" err="1">
+                <a:solidFill>
+                  <a:schemeClr val="tx1">
+                    <a:lumMod val="50000"/>
+                  </a:schemeClr>
+                </a:solidFill>
+              </a:rPr>
+              <a:t>fairness</a:t>
+            </a:r>
+            <a:endParaRPr sz="2000" dirty="0">
+              <a:solidFill>
+                <a:schemeClr val="tx1">
+                  <a:lumMod val="50000"/>
+                </a:schemeClr>
+              </a:solidFill>
+            </a:endParaRPr>
+          </a:p>
+        </p:txBody>
+      </p:sp>
+      <p:sp>
+        <p:nvSpPr>
+          <p:cNvPr id="14" name="SUBTITLE">
+            <a:extLst>
+              <a:ext uri="{FF2B5EF4-FFF2-40B4-BE49-F238E27FC236}">
+                <a16:creationId xmlns:a16="http://schemas.microsoft.com/office/drawing/2014/main" id="{E6B6B1F7-F3E2-E607-7197-94448F1C30FA}"/>
+              </a:ext>
+            </a:extLst>
+          </p:cNvPr>
+          <p:cNvSpPr txBox="1"/>
+          <p:nvPr/>
+        </p:nvSpPr>
+        <p:spPr>
+          <a:xfrm>
+            <a:off x="3523779" y="1940648"/>
+            <a:ext cx="2442976" cy="210314"/>
+          </a:xfrm>
+          <a:prstGeom prst="rect">
+            <a:avLst/>
+          </a:prstGeom>
+          <a:noFill/>
+          <a:ln w="12700" cap="flat">
+            <a:noFill/>
+            <a:miter lim="400000"/>
+          </a:ln>
+          <a:effectLst/>
+          <a:extLst>
+            <a:ext uri="{C572A759-6A51-4108-AA02-DFA0A04FC94B}">
+              <ma14:wrappingTextBoxFlag xmlns:lc="http://schemas.openxmlformats.org/drawingml/2006/lockedCanvas" xmlns:ma14="http://schemas.microsoft.com/office/mac/drawingml/2011/main" xmlns:a14="http://schemas.microsoft.com/office/drawing/2010/main" xmlns:m="http://schemas.openxmlformats.org/officeDocument/2006/math" xmlns="" val="1"/>
+            </a:ext>
+          </a:extLst>
+        </p:spPr>
+        <p:txBody>
+          <a:bodyPr wrap="none" lIns="12700" tIns="12700" rIns="12700" bIns="12700" numCol="1" anchor="ctr">
+            <a:spAutoFit/>
+          </a:bodyPr>
+          <a:lstStyle>
+            <a:defPPr marL="0" marR="0" indent="0" algn="l" defTabSz="914400" rtl="0" fontAlgn="auto" latinLnBrk="1" hangingPunct="0">
+              <a:lnSpc>
+                <a:spcPct val="100000"/>
+              </a:lnSpc>
+              <a:spcBef>
+                <a:spcPts val="0"/>
+              </a:spcBef>
+              <a:spcAft>
+                <a:spcPts val="0"/>
+              </a:spcAft>
+              <a:buClrTx/>
+              <a:buSzTx/>
+              <a:buFontTx/>
+              <a:buNone/>
+              <a:tabLst/>
+              <a:defRPr kumimoji="0" sz="1800" b="0" i="0" u="none" strike="noStrike" cap="none" spc="0" normalizeH="0" baseline="0">
+                <a:ln>
+                  <a:noFill/>
+                </a:ln>
+                <a:solidFill>
+                  <a:srgbClr val="000000"/>
+                </a:solidFill>
+                <a:effectLst/>
+                <a:uFillTx/>
+              </a:defRPr>
+            </a:defPPr>
+            <a:lvl1pPr marL="0" marR="0" indent="0" algn="l" defTabSz="584200" rtl="0" fontAlgn="auto" latinLnBrk="0" hangingPunct="0">
+              <a:lnSpc>
+                <a:spcPct val="100000"/>
+              </a:lnSpc>
+              <a:spcBef>
+                <a:spcPts val="200"/>
+              </a:spcBef>
+              <a:spcAft>
+                <a:spcPts val="0"/>
+              </a:spcAft>
+              <a:buClrTx/>
+              <a:buSzTx/>
+              <a:buFontTx/>
+              <a:buNone/>
+              <a:tabLst/>
+              <a:defRPr kumimoji="0" sz="1200" b="1" i="0" u="none" strike="noStrike" cap="none" spc="0" normalizeH="0" baseline="0">
+                <a:ln>
+                  <a:noFill/>
+                </a:ln>
+                <a:solidFill>
+                  <a:srgbClr val="4C4C4C"/>
+                </a:solidFill>
+                <a:effectLst/>
+                <a:uFillTx/>
+                <a:latin typeface="Source Sans Pro"/>
+                <a:ea typeface="Source Sans Pro"/>
+                <a:cs typeface="Source Sans Pro"/>
+                <a:sym typeface="Source Sans Pro"/>
+              </a:defRPr>
+            </a:lvl1pPr>
+            <a:lvl2pPr marL="0" marR="0" indent="228600" algn="l" defTabSz="584200" rtl="0" fontAlgn="auto" latinLnBrk="0" hangingPunct="0">
+              <a:lnSpc>
+                <a:spcPct val="100000"/>
+              </a:lnSpc>
+              <a:spcBef>
+                <a:spcPts val="200"/>
+              </a:spcBef>
+              <a:spcAft>
+                <a:spcPts val="0"/>
+              </a:spcAft>
+              <a:buClrTx/>
+              <a:buSzTx/>
+              <a:buFontTx/>
+              <a:buNone/>
+              <a:tabLst/>
+              <a:defRPr kumimoji="0" sz="1200" b="1" i="0" u="none" strike="noStrike" cap="none" spc="0" normalizeH="0" baseline="0">
+                <a:ln>
+                  <a:noFill/>
+                </a:ln>
+                <a:solidFill>
+                  <a:srgbClr val="4C4C4C"/>
+                </a:solidFill>
+                <a:effectLst/>
+                <a:uFillTx/>
+                <a:latin typeface="Source Sans Pro"/>
+                <a:ea typeface="Source Sans Pro"/>
+                <a:cs typeface="Source Sans Pro"/>
+                <a:sym typeface="Source Sans Pro"/>
+              </a:defRPr>
+            </a:lvl2pPr>
+            <a:lvl3pPr marL="0" marR="0" indent="457200" algn="l" defTabSz="584200" rtl="0" fontAlgn="auto" latinLnBrk="0" hangingPunct="0">
+              <a:lnSpc>
+                <a:spcPct val="100000"/>
+              </a:lnSpc>
+              <a:spcBef>
+                <a:spcPts val="200"/>
+              </a:spcBef>
+              <a:spcAft>
+                <a:spcPts val="0"/>
+              </a:spcAft>
+              <a:buClrTx/>
+              <a:buSzTx/>
+              <a:buFontTx/>
+              <a:buNone/>
+              <a:tabLst/>
+              <a:defRPr kumimoji="0" sz="1200" b="1" i="0" u="none" strike="noStrike" cap="none" spc="0" normalizeH="0" baseline="0">
+                <a:ln>
+                  <a:noFill/>
+                </a:ln>
+                <a:solidFill>
+                  <a:srgbClr val="4C4C4C"/>
+                </a:solidFill>
+                <a:effectLst/>
+                <a:uFillTx/>
+                <a:latin typeface="Source Sans Pro"/>
+                <a:ea typeface="Source Sans Pro"/>
+                <a:cs typeface="Source Sans Pro"/>
+                <a:sym typeface="Source Sans Pro"/>
+              </a:defRPr>
+            </a:lvl3pPr>
+            <a:lvl4pPr marL="0" marR="0" indent="685800" algn="l" defTabSz="584200" rtl="0" fontAlgn="auto" latinLnBrk="0" hangingPunct="0">
+              <a:lnSpc>
+                <a:spcPct val="100000"/>
+              </a:lnSpc>
+              <a:spcBef>
+                <a:spcPts val="200"/>
+              </a:spcBef>
+              <a:spcAft>
+                <a:spcPts val="0"/>
+              </a:spcAft>
+              <a:buClrTx/>
+              <a:buSzTx/>
+              <a:buFontTx/>
+              <a:buNone/>
+              <a:tabLst/>
+              <a:defRPr kumimoji="0" sz="1200" b="1" i="0" u="none" strike="noStrike" cap="none" spc="0" normalizeH="0" baseline="0">
+                <a:ln>
+                  <a:noFill/>
+                </a:ln>
+                <a:solidFill>
+                  <a:srgbClr val="4C4C4C"/>
+                </a:solidFill>
+                <a:effectLst/>
+                <a:uFillTx/>
+                <a:latin typeface="Source Sans Pro"/>
+                <a:ea typeface="Source Sans Pro"/>
+                <a:cs typeface="Source Sans Pro"/>
+                <a:sym typeface="Source Sans Pro"/>
+              </a:defRPr>
+            </a:lvl4pPr>
+            <a:lvl5pPr marL="0" marR="0" indent="914400" algn="l" defTabSz="584200" rtl="0" fontAlgn="auto" latinLnBrk="0" hangingPunct="0">
+              <a:lnSpc>
+                <a:spcPct val="100000"/>
+              </a:lnSpc>
+              <a:spcBef>
+                <a:spcPts val="200"/>
+              </a:spcBef>
+              <a:spcAft>
+                <a:spcPts val="0"/>
+              </a:spcAft>
+              <a:buClrTx/>
+              <a:buSzTx/>
+              <a:buFontTx/>
+              <a:buNone/>
+              <a:tabLst/>
+              <a:defRPr kumimoji="0" sz="1200" b="1" i="0" u="none" strike="noStrike" cap="none" spc="0" normalizeH="0" baseline="0">
+                <a:ln>
+                  <a:noFill/>
+                </a:ln>
+                <a:solidFill>
+                  <a:srgbClr val="4C4C4C"/>
+                </a:solidFill>
+                <a:effectLst/>
+                <a:uFillTx/>
+                <a:latin typeface="Source Sans Pro"/>
+                <a:ea typeface="Source Sans Pro"/>
+                <a:cs typeface="Source Sans Pro"/>
+                <a:sym typeface="Source Sans Pro"/>
+              </a:defRPr>
+            </a:lvl5pPr>
+            <a:lvl6pPr marL="0" marR="0" indent="1143000" algn="l" defTabSz="584200" rtl="0" fontAlgn="auto" latinLnBrk="0" hangingPunct="0">
+              <a:lnSpc>
+                <a:spcPct val="100000"/>
+              </a:lnSpc>
+              <a:spcBef>
+                <a:spcPts val="200"/>
+              </a:spcBef>
+              <a:spcAft>
+                <a:spcPts val="0"/>
+              </a:spcAft>
+              <a:buClrTx/>
+              <a:buSzTx/>
+              <a:buFontTx/>
+              <a:buNone/>
+              <a:tabLst/>
+              <a:defRPr kumimoji="0" sz="1200" b="1" i="0" u="none" strike="noStrike" cap="none" spc="0" normalizeH="0" baseline="0">
+                <a:ln>
+                  <a:noFill/>
+                </a:ln>
+                <a:solidFill>
+                  <a:srgbClr val="4C4C4C"/>
+                </a:solidFill>
+                <a:effectLst/>
+                <a:uFillTx/>
+                <a:latin typeface="Source Sans Pro"/>
+                <a:ea typeface="Source Sans Pro"/>
+                <a:cs typeface="Source Sans Pro"/>
+                <a:sym typeface="Source Sans Pro"/>
+              </a:defRPr>
+            </a:lvl6pPr>
+            <a:lvl7pPr marL="0" marR="0" indent="1371600" algn="l" defTabSz="584200" rtl="0" fontAlgn="auto" latinLnBrk="0" hangingPunct="0">
+              <a:lnSpc>
+                <a:spcPct val="100000"/>
+              </a:lnSpc>
+              <a:spcBef>
+                <a:spcPts val="200"/>
+              </a:spcBef>
+              <a:spcAft>
+                <a:spcPts val="0"/>
+              </a:spcAft>
+              <a:buClrTx/>
+              <a:buSzTx/>
+              <a:buFontTx/>
+              <a:buNone/>
+              <a:tabLst/>
+              <a:defRPr kumimoji="0" sz="1200" b="1" i="0" u="none" strike="noStrike" cap="none" spc="0" normalizeH="0" baseline="0">
+                <a:ln>
+                  <a:noFill/>
+                </a:ln>
+                <a:solidFill>
+                  <a:srgbClr val="4C4C4C"/>
+                </a:solidFill>
+                <a:effectLst/>
+                <a:uFillTx/>
+                <a:latin typeface="Source Sans Pro"/>
+                <a:ea typeface="Source Sans Pro"/>
+                <a:cs typeface="Source Sans Pro"/>
+                <a:sym typeface="Source Sans Pro"/>
+              </a:defRPr>
+            </a:lvl7pPr>
+            <a:lvl8pPr marL="0" marR="0" indent="1600200" algn="l" defTabSz="584200" rtl="0" fontAlgn="auto" latinLnBrk="0" hangingPunct="0">
+              <a:lnSpc>
+                <a:spcPct val="100000"/>
+              </a:lnSpc>
+              <a:spcBef>
+                <a:spcPts val="200"/>
+              </a:spcBef>
+              <a:spcAft>
+                <a:spcPts val="0"/>
+              </a:spcAft>
+              <a:buClrTx/>
+              <a:buSzTx/>
+              <a:buFontTx/>
+              <a:buNone/>
+              <a:tabLst/>
+              <a:defRPr kumimoji="0" sz="1200" b="1" i="0" u="none" strike="noStrike" cap="none" spc="0" normalizeH="0" baseline="0">
+                <a:ln>
+                  <a:noFill/>
+                </a:ln>
+                <a:solidFill>
+                  <a:srgbClr val="4C4C4C"/>
+                </a:solidFill>
+                <a:effectLst/>
+                <a:uFillTx/>
+                <a:latin typeface="Source Sans Pro"/>
+                <a:ea typeface="Source Sans Pro"/>
+                <a:cs typeface="Source Sans Pro"/>
+                <a:sym typeface="Source Sans Pro"/>
+              </a:defRPr>
+            </a:lvl8pPr>
+            <a:lvl9pPr marL="0" marR="0" indent="1828800" algn="l" defTabSz="584200" rtl="0" fontAlgn="auto" latinLnBrk="0" hangingPunct="0">
+              <a:lnSpc>
+                <a:spcPct val="100000"/>
+              </a:lnSpc>
+              <a:spcBef>
+                <a:spcPts val="200"/>
+              </a:spcBef>
+              <a:spcAft>
+                <a:spcPts val="0"/>
+              </a:spcAft>
+              <a:buClrTx/>
+              <a:buSzTx/>
+              <a:buFontTx/>
+              <a:buNone/>
+              <a:tabLst/>
+              <a:defRPr kumimoji="0" sz="1200" b="1" i="0" u="none" strike="noStrike" cap="none" spc="0" normalizeH="0" baseline="0">
+                <a:ln>
+                  <a:noFill/>
+                </a:ln>
+                <a:solidFill>
+                  <a:srgbClr val="4C4C4C"/>
+                </a:solidFill>
+                <a:effectLst/>
+                <a:uFillTx/>
+                <a:latin typeface="Source Sans Pro"/>
+                <a:ea typeface="Source Sans Pro"/>
+                <a:cs typeface="Source Sans Pro"/>
+                <a:sym typeface="Source Sans Pro"/>
+              </a:defRPr>
+            </a:lvl9pPr>
+          </a:lstStyle>
+          <a:p>
+            <a:pPr lvl="1" indent="0"/>
+            <a:r>
+              <a:rPr lang="nl-NL" dirty="0" err="1">
+                <a:solidFill>
+                  <a:schemeClr val="tx1">
+                    <a:lumMod val="60000"/>
+                    <a:lumOff val="40000"/>
+                  </a:schemeClr>
+                </a:solidFill>
+                <a:latin typeface="Courier New" panose="02070309020205020404" pitchFamily="49" charset="0"/>
+                <a:cs typeface="Courier New" panose="02070309020205020404" pitchFamily="49" charset="0"/>
+              </a:rPr>
+              <a:t>jfa</a:t>
+            </a:r>
+            <a:r>
+              <a:rPr lang="nl-NL" dirty="0">
+                <a:solidFill>
+                  <a:schemeClr val="tx1">
+                    <a:lumMod val="60000"/>
+                    <a:lumOff val="40000"/>
+                  </a:schemeClr>
+                </a:solidFill>
+                <a:latin typeface="Courier New" panose="02070309020205020404" pitchFamily="49" charset="0"/>
+                <a:cs typeface="Courier New" panose="02070309020205020404" pitchFamily="49" charset="0"/>
+              </a:rPr>
+              <a:t>::</a:t>
+            </a:r>
+            <a:r>
+              <a:rPr lang="nl-NL" dirty="0" err="1">
+                <a:solidFill>
+                  <a:schemeClr val="tx1">
+                    <a:lumMod val="60000"/>
+                    <a:lumOff val="40000"/>
+                  </a:schemeClr>
+                </a:solidFill>
+                <a:latin typeface="Courier New" panose="02070309020205020404" pitchFamily="49" charset="0"/>
+                <a:cs typeface="Courier New" panose="02070309020205020404" pitchFamily="49" charset="0"/>
+              </a:rPr>
+              <a:t>fairness_selection</a:t>
+            </a:r>
+            <a:r>
+              <a:rPr lang="nl-NL" dirty="0">
+                <a:solidFill>
+                  <a:schemeClr val="tx1">
+                    <a:lumMod val="60000"/>
+                    <a:lumOff val="40000"/>
+                  </a:schemeClr>
+                </a:solidFill>
+                <a:latin typeface="Courier New" panose="02070309020205020404" pitchFamily="49" charset="0"/>
+                <a:cs typeface="Courier New" panose="02070309020205020404" pitchFamily="49" charset="0"/>
+              </a:rPr>
+              <a:t>()</a:t>
+            </a:r>
+            <a:endParaRPr dirty="0">
+              <a:solidFill>
+                <a:schemeClr val="tx1">
+                  <a:lumMod val="60000"/>
+                  <a:lumOff val="40000"/>
+                </a:schemeClr>
+              </a:solidFill>
+              <a:latin typeface="Courier New" panose="02070309020205020404" pitchFamily="49" charset="0"/>
+              <a:cs typeface="Courier New" panose="02070309020205020404" pitchFamily="49" charset="0"/>
+            </a:endParaRPr>
+          </a:p>
+        </p:txBody>
+      </p:sp>
+      <p:pic>
+        <p:nvPicPr>
+          <p:cNvPr id="5" name="Picture 4">
+            <a:extLst>
+              <a:ext uri="{FF2B5EF4-FFF2-40B4-BE49-F238E27FC236}">
+                <a16:creationId xmlns:a16="http://schemas.microsoft.com/office/drawing/2014/main" id="{9D598E9F-ACC8-44EF-92E4-287D4B9B8AE0}"/>
+              </a:ext>
+            </a:extLst>
+          </p:cNvPr>
+          <p:cNvPicPr>
+            <a:picLocks noChangeAspect="1"/>
+          </p:cNvPicPr>
+          <p:nvPr/>
+        </p:nvPicPr>
+        <p:blipFill>
+          <a:blip r:embed="rId8">
+            <a:extLst>
+              <a:ext uri="{28A0092B-C50C-407E-A947-70E740481C1C}">
+                <a14:useLocalDpi xmlns:a14="http://schemas.microsoft.com/office/drawing/2010/main" val="0"/>
+              </a:ext>
+            </a:extLst>
+          </a:blip>
+          <a:srcRect/>
+          <a:stretch/>
+        </p:blipFill>
+        <p:spPr>
+          <a:xfrm>
+            <a:off x="11906251" y="181433"/>
+            <a:ext cx="1561260" cy="1796389"/>
+          </a:xfrm>
+          <a:prstGeom prst="rect">
+            <a:avLst/>
+          </a:prstGeom>
+        </p:spPr>
+      </p:pic>
     </p:spTree>
   </p:cSld>
   <p:clrMapOvr>

</xml_diff>